<commit_message>
fix capitalization of donate
</commit_message>
<xml_diff>
--- a/Images/Donate.pptx
+++ b/Images/Donate.pptx
@@ -16294,121 +16294,100 @@
           </a:p>
         </p:txBody>
       </p:sp>
-      <p:grpSp>
-        <p:nvGrpSpPr>
-          <p:cNvPr id="7" name="Group 6">
+      <p:sp>
+        <p:nvSpPr>
+          <p:cNvPr id="5" name="Rectangle: Rounded Corners 4">
             <a:extLst>
               <a:ext uri="{FF2B5EF4-FFF2-40B4-BE49-F238E27FC236}">
-                <a16:creationId xmlns:a16="http://schemas.microsoft.com/office/drawing/2014/main" id="{BC0EA8EA-94A7-47BC-AB70-5292E0D982C7}"/>
+                <a16:creationId xmlns:a16="http://schemas.microsoft.com/office/drawing/2014/main" id="{79BF7578-BE11-4421-8F43-D58B530B9BB2}"/>
               </a:ext>
             </a:extLst>
           </p:cNvPr>
-          <p:cNvGrpSpPr/>
+          <p:cNvSpPr/>
           <p:nvPr/>
-        </p:nvGrpSpPr>
-        <p:grpSpPr>
+        </p:nvSpPr>
+        <p:spPr>
           <a:xfrm>
             <a:off x="3051887" y="2149972"/>
             <a:ext cx="1614382" cy="457200"/>
-            <a:chOff x="3051887" y="2149972"/>
-            <a:chExt cx="1614382" cy="457200"/>
           </a:xfrm>
-        </p:grpSpPr>
-        <p:sp>
-          <p:nvSpPr>
-            <p:cNvPr id="5" name="Rectangle: Rounded Corners 4">
-              <a:extLst>
-                <a:ext uri="{FF2B5EF4-FFF2-40B4-BE49-F238E27FC236}">
-                  <a16:creationId xmlns:a16="http://schemas.microsoft.com/office/drawing/2014/main" id="{79BF7578-BE11-4421-8F43-D58B530B9BB2}"/>
-                </a:ext>
-              </a:extLst>
-            </p:cNvPr>
-            <p:cNvSpPr/>
-            <p:nvPr/>
-          </p:nvSpPr>
-          <p:spPr>
-            <a:xfrm>
-              <a:off x="3051887" y="2149972"/>
-              <a:ext cx="1614382" cy="457200"/>
-            </a:xfrm>
-            <a:prstGeom prst="roundRect">
-              <a:avLst>
-                <a:gd name="adj" fmla="val 50000"/>
-              </a:avLst>
-            </a:prstGeom>
+          <a:prstGeom prst="roundRect">
+            <a:avLst>
+              <a:gd name="adj" fmla="val 50000"/>
+            </a:avLst>
+          </a:prstGeom>
+          <a:solidFill>
+            <a:srgbClr val="1F4E79"/>
+          </a:solidFill>
+          <a:ln>
             <a:solidFill>
-              <a:srgbClr val="1F4E79"/>
+              <a:srgbClr val="39B54A"/>
             </a:solidFill>
-            <a:ln>
-              <a:solidFill>
-                <a:srgbClr val="39B54A"/>
-              </a:solidFill>
-            </a:ln>
-          </p:spPr>
-          <p:style>
-            <a:lnRef idx="2">
-              <a:schemeClr val="accent1">
-                <a:shade val="50000"/>
-              </a:schemeClr>
-            </a:lnRef>
-            <a:fillRef idx="1">
-              <a:schemeClr val="accent1"/>
-            </a:fillRef>
-            <a:effectRef idx="0">
-              <a:schemeClr val="accent1"/>
-            </a:effectRef>
-            <a:fontRef idx="minor">
-              <a:schemeClr val="lt1"/>
-            </a:fontRef>
-          </p:style>
-          <p:txBody>
-            <a:bodyPr rot="0" spcFirstLastPara="0" vertOverflow="overflow" horzOverflow="overflow" vert="horz" wrap="square" lIns="91440" tIns="45720" rIns="91440" bIns="45720" numCol="1" spcCol="0" rtlCol="0" fromWordArt="0" anchor="ctr" anchorCtr="0" forceAA="0" compatLnSpc="1">
-              <a:prstTxWarp prst="textNoShape">
-                <a:avLst/>
-              </a:prstTxWarp>
-              <a:noAutofit/>
-            </a:bodyPr>
-            <a:lstStyle/>
-            <a:p>
-              <a:r>
-                <a:rPr lang="en-US" sz="2400" dirty="0">
-                  <a:latin typeface="Lato" panose="020F0502020204030203" pitchFamily="34" charset="0"/>
-                </a:rPr>
-                <a:t>Donate</a:t>
-              </a:r>
-            </a:p>
-          </p:txBody>
-        </p:sp>
-        <p:pic>
-          <p:nvPicPr>
-            <p:cNvPr id="3" name="Picture 2">
-              <a:extLst>
-                <a:ext uri="{FF2B5EF4-FFF2-40B4-BE49-F238E27FC236}">
-                  <a16:creationId xmlns:a16="http://schemas.microsoft.com/office/drawing/2014/main" id="{E5C183C4-C342-4E41-A436-1169448A6585}"/>
-                </a:ext>
-              </a:extLst>
-            </p:cNvPr>
-            <p:cNvPicPr>
-              <a:picLocks noChangeAspect="1"/>
-            </p:cNvPicPr>
-            <p:nvPr/>
-          </p:nvPicPr>
-          <p:blipFill rotWithShape="1">
-            <a:blip r:embed="rId2"/>
-            <a:srcRect r="78073"/>
-            <a:stretch/>
-          </p:blipFill>
-          <p:spPr>
-            <a:xfrm>
-              <a:off x="4278981" y="2215299"/>
-              <a:ext cx="255311" cy="309909"/>
-            </a:xfrm>
-            <a:prstGeom prst="rect">
+          </a:ln>
+        </p:spPr>
+        <p:style>
+          <a:lnRef idx="2">
+            <a:schemeClr val="accent1">
+              <a:shade val="50000"/>
+            </a:schemeClr>
+          </a:lnRef>
+          <a:fillRef idx="1">
+            <a:schemeClr val="accent1"/>
+          </a:fillRef>
+          <a:effectRef idx="0">
+            <a:schemeClr val="accent1"/>
+          </a:effectRef>
+          <a:fontRef idx="minor">
+            <a:schemeClr val="lt1"/>
+          </a:fontRef>
+        </p:style>
+        <p:txBody>
+          <a:bodyPr rot="0" spcFirstLastPara="0" vertOverflow="overflow" horzOverflow="overflow" vert="horz" wrap="square" lIns="91440" tIns="45720" rIns="91440" bIns="45720" numCol="1" spcCol="0" rtlCol="0" fromWordArt="0" anchor="ctr" anchorCtr="0" forceAA="0" compatLnSpc="1">
+            <a:prstTxWarp prst="textNoShape">
               <a:avLst/>
-            </a:prstGeom>
-          </p:spPr>
-        </p:pic>
-      </p:grpSp>
+            </a:prstTxWarp>
+            <a:noAutofit/>
+          </a:bodyPr>
+          <a:lstStyle/>
+          <a:p>
+            <a:r>
+              <a:rPr lang="en-US" sz="2400" dirty="0">
+                <a:latin typeface="Lato" panose="020F0502020204030203" pitchFamily="34" charset="0"/>
+              </a:rPr>
+              <a:t>Donate</a:t>
+            </a:r>
+          </a:p>
+        </p:txBody>
+      </p:sp>
+      <p:pic>
+        <p:nvPicPr>
+          <p:cNvPr id="3" name="Picture 2">
+            <a:extLst>
+              <a:ext uri="{FF2B5EF4-FFF2-40B4-BE49-F238E27FC236}">
+                <a16:creationId xmlns:a16="http://schemas.microsoft.com/office/drawing/2014/main" id="{E5C183C4-C342-4E41-A436-1169448A6585}"/>
+              </a:ext>
+            </a:extLst>
+          </p:cNvPr>
+          <p:cNvPicPr>
+            <a:picLocks noChangeAspect="1"/>
+          </p:cNvPicPr>
+          <p:nvPr/>
+        </p:nvPicPr>
+        <p:blipFill rotWithShape="1">
+          <a:blip r:embed="rId2"/>
+          <a:srcRect r="78073"/>
+          <a:stretch/>
+        </p:blipFill>
+        <p:spPr>
+          <a:xfrm>
+            <a:off x="4278981" y="2215299"/>
+            <a:ext cx="255311" cy="309909"/>
+          </a:xfrm>
+          <a:prstGeom prst="rect">
+            <a:avLst/>
+          </a:prstGeom>
+        </p:spPr>
+      </p:pic>
       <p:sp>
         <p:nvSpPr>
           <p:cNvPr id="6" name="Rectangle 5">

</xml_diff>